<commit_message>
model description part added in report
</commit_message>
<xml_diff>
--- a/flashtalk/Back to home in desert.pptx
+++ b/flashtalk/Back to home in desert.pptx
@@ -5,10 +5,11 @@
     <p:sldMasterId id="2147483648" r:id="rId1"/>
   </p:sldMasterIdLst>
   <p:notesMasterIdLst>
-    <p:notesMasterId r:id="rId3"/>
+    <p:notesMasterId r:id="rId4"/>
   </p:notesMasterIdLst>
   <p:sldIdLst>
     <p:sldId id="256" r:id="rId2"/>
+    <p:sldId id="257" r:id="rId3"/>
   </p:sldIdLst>
   <p:sldSz cx="12192000" cy="6858000"/>
   <p:notesSz cx="6858000" cy="9144000"/>
@@ -107,6 +108,11 @@
       </a:defRPr>
     </a:lvl9pPr>
   </p:defaultTextStyle>
+  <p:extLst>
+    <p:ext uri="{EFAFB233-063F-42B5-8137-9DF3F51BA10A}">
+      <p15:sldGuideLst xmlns:p15="http://schemas.microsoft.com/office/powerpoint/2012/main"/>
+    </p:ext>
+  </p:extLst>
 </p:presentation>
 </file>
 
@@ -192,7 +198,7 @@
           <a:p>
             <a:fld id="{B5700F98-BD74-4A04-A1CE-DBAF12E2D71A}" type="datetimeFigureOut">
               <a:rPr lang="de-CH" smtClean="0"/>
-              <a:t>08.10.2018</a:t>
+              <a:t>06.12.2018</a:t>
             </a:fld>
             <a:endParaRPr lang="de-CH"/>
           </a:p>
@@ -609,7 +615,7 @@
           <a:p>
             <a:fld id="{D1E192D4-AA6F-421B-8D7D-90A60BE55B3C}" type="datetime1">
               <a:rPr lang="de-CH" smtClean="0"/>
-              <a:t>08.10.2018</a:t>
+              <a:t>06.12.2018</a:t>
             </a:fld>
             <a:endParaRPr lang="de-CH"/>
           </a:p>
@@ -812,7 +818,7 @@
           <a:p>
             <a:fld id="{0784FCB5-D93F-46E9-A33E-CEF55C178C85}" type="datetime1">
               <a:rPr lang="de-CH" smtClean="0"/>
-              <a:t>08.10.2018</a:t>
+              <a:t>06.12.2018</a:t>
             </a:fld>
             <a:endParaRPr lang="de-CH"/>
           </a:p>
@@ -1025,7 +1031,7 @@
           <a:p>
             <a:fld id="{B316D32F-4DEB-4A7E-9AC4-7F0F6CAC5E56}" type="datetime1">
               <a:rPr lang="de-CH" smtClean="0"/>
-              <a:t>08.10.2018</a:t>
+              <a:t>06.12.2018</a:t>
             </a:fld>
             <a:endParaRPr lang="de-CH"/>
           </a:p>
@@ -1228,7 +1234,7 @@
           <a:p>
             <a:fld id="{0EC7D180-C5BE-4800-8562-AE0630BCC29D}" type="datetime1">
               <a:rPr lang="de-CH" smtClean="0"/>
-              <a:t>08.10.2018</a:t>
+              <a:t>06.12.2018</a:t>
             </a:fld>
             <a:endParaRPr lang="de-CH"/>
           </a:p>
@@ -1507,7 +1513,7 @@
           <a:p>
             <a:fld id="{226EB56B-273F-4744-8770-24B01C7FF210}" type="datetime1">
               <a:rPr lang="de-CH" smtClean="0"/>
-              <a:t>08.10.2018</a:t>
+              <a:t>06.12.2018</a:t>
             </a:fld>
             <a:endParaRPr lang="de-CH"/>
           </a:p>
@@ -1778,7 +1784,7 @@
           <a:p>
             <a:fld id="{520905D7-98B2-4A28-83FD-9092A814DFEA}" type="datetime1">
               <a:rPr lang="de-CH" smtClean="0"/>
-              <a:t>08.10.2018</a:t>
+              <a:t>06.12.2018</a:t>
             </a:fld>
             <a:endParaRPr lang="de-CH"/>
           </a:p>
@@ -2196,7 +2202,7 @@
           <a:p>
             <a:fld id="{8B0A0965-2C92-4672-8872-267BBA6F7455}" type="datetime1">
               <a:rPr lang="de-CH" smtClean="0"/>
-              <a:t>08.10.2018</a:t>
+              <a:t>06.12.2018</a:t>
             </a:fld>
             <a:endParaRPr lang="de-CH"/>
           </a:p>
@@ -2341,7 +2347,7 @@
           <a:p>
             <a:fld id="{F4628119-907F-4FCF-8BC0-EE795B5D278F}" type="datetime1">
               <a:rPr lang="de-CH" smtClean="0"/>
-              <a:t>08.10.2018</a:t>
+              <a:t>06.12.2018</a:t>
             </a:fld>
             <a:endParaRPr lang="de-CH"/>
           </a:p>
@@ -2457,7 +2463,7 @@
           <a:p>
             <a:fld id="{50E7118E-1818-494E-BEA0-482C9D8B3AF6}" type="datetime1">
               <a:rPr lang="de-CH" smtClean="0"/>
-              <a:t>08.10.2018</a:t>
+              <a:t>06.12.2018</a:t>
             </a:fld>
             <a:endParaRPr lang="de-CH"/>
           </a:p>
@@ -2773,7 +2779,7 @@
           <a:p>
             <a:fld id="{D6CD812E-BB83-4138-95E2-EDA227A321B4}" type="datetime1">
               <a:rPr lang="de-CH" smtClean="0"/>
-              <a:t>08.10.2018</a:t>
+              <a:t>06.12.2018</a:t>
             </a:fld>
             <a:endParaRPr lang="de-CH"/>
           </a:p>
@@ -3065,7 +3071,7 @@
           <a:p>
             <a:fld id="{5E03B577-AFD8-4382-90A0-49A117E6F82B}" type="datetime1">
               <a:rPr lang="de-CH" smtClean="0"/>
-              <a:t>08.10.2018</a:t>
+              <a:t>06.12.2018</a:t>
             </a:fld>
             <a:endParaRPr lang="de-CH"/>
           </a:p>
@@ -3311,7 +3317,7 @@
           <a:p>
             <a:fld id="{A2ECEC7D-4871-4CDC-A2BF-F09FFC3540D8}" type="datetime1">
               <a:rPr lang="de-CH" smtClean="0"/>
-              <a:t>08.10.2018</a:t>
+              <a:t>06.12.2018</a:t>
             </a:fld>
             <a:endParaRPr lang="de-CH"/>
           </a:p>
@@ -4012,178 +4018,20 @@
               <a:buChar char="•"/>
             </a:pPr>
             <a:r>
-              <a:rPr lang="de-CH" sz="2000" dirty="0" err="1">
+              <a:rPr lang="de-CH" sz="1600" dirty="0">
                 <a:solidFill>
                   <a:srgbClr val="000000"/>
                 </a:solidFill>
               </a:rPr>
-              <a:t>navigation</a:t>
-            </a:r>
-            <a:r>
-              <a:rPr lang="de-CH" sz="2000" dirty="0">
-                <a:solidFill>
-                  <a:srgbClr val="000000"/>
-                </a:solidFill>
-              </a:rPr>
-              <a:t> </a:t>
-            </a:r>
-            <a:r>
-              <a:rPr lang="de-CH" sz="2000" dirty="0" err="1">
-                <a:solidFill>
-                  <a:srgbClr val="000000"/>
-                </a:solidFill>
-              </a:rPr>
-              <a:t>by</a:t>
-            </a:r>
-            <a:r>
-              <a:rPr lang="de-CH" sz="2000" dirty="0">
-                <a:solidFill>
-                  <a:srgbClr val="000000"/>
-                </a:solidFill>
-              </a:rPr>
-              <a:t> </a:t>
-            </a:r>
-            <a:r>
-              <a:rPr lang="de-CH" sz="2000" dirty="0" err="1">
-                <a:solidFill>
-                  <a:srgbClr val="000000"/>
-                </a:solidFill>
-              </a:rPr>
-              <a:t>landmarks</a:t>
-            </a:r>
-            <a:r>
-              <a:rPr lang="de-CH" sz="2000" dirty="0">
-                <a:solidFill>
-                  <a:srgbClr val="000000"/>
-                </a:solidFill>
-              </a:rPr>
-              <a:t> </a:t>
-            </a:r>
-            <a:r>
-              <a:rPr lang="de-CH" sz="2000" dirty="0" err="1">
-                <a:solidFill>
-                  <a:srgbClr val="000000"/>
-                </a:solidFill>
-              </a:rPr>
-              <a:t>or</a:t>
-            </a:r>
-            <a:r>
-              <a:rPr lang="de-CH" sz="2000" dirty="0">
-                <a:solidFill>
-                  <a:srgbClr val="000000"/>
-                </a:solidFill>
-              </a:rPr>
-              <a:t> </a:t>
-            </a:r>
-            <a:r>
-              <a:rPr lang="de-CH" sz="2000" dirty="0" err="1">
-                <a:solidFill>
-                  <a:srgbClr val="000000"/>
-                </a:solidFill>
-              </a:rPr>
-              <a:t>memory</a:t>
-            </a:r>
-            <a:endParaRPr lang="de-CH" sz="2000" dirty="0">
-              <a:solidFill>
-                <a:srgbClr val="000000"/>
-              </a:solidFill>
-            </a:endParaRPr>
-          </a:p>
-          <a:p>
-            <a:pPr marL="285750" indent="-285750" algn="l">
-              <a:buFont typeface="Arial" panose="020B0604020202020204" pitchFamily="34" charset="0"/>
-              <a:buChar char="•"/>
-            </a:pPr>
-            <a:r>
-              <a:rPr lang="de-CH" sz="2000" dirty="0" err="1">
-                <a:solidFill>
-                  <a:srgbClr val="000000"/>
-                </a:solidFill>
-              </a:rPr>
-              <a:t>reproduce</a:t>
-            </a:r>
-            <a:r>
-              <a:rPr lang="de-CH" sz="2000" dirty="0">
-                <a:solidFill>
-                  <a:srgbClr val="000000"/>
-                </a:solidFill>
-              </a:rPr>
-              <a:t> </a:t>
-            </a:r>
-            <a:r>
-              <a:rPr lang="de-CH" sz="2000" dirty="0" err="1">
-                <a:solidFill>
-                  <a:srgbClr val="000000"/>
-                </a:solidFill>
-              </a:rPr>
-              <a:t>testing</a:t>
-            </a:r>
-            <a:r>
-              <a:rPr lang="de-CH" sz="2000" dirty="0">
-                <a:solidFill>
-                  <a:srgbClr val="000000"/>
-                </a:solidFill>
-              </a:rPr>
-              <a:t> </a:t>
-            </a:r>
-            <a:r>
-              <a:rPr lang="de-CH" sz="2000" dirty="0" err="1">
-                <a:solidFill>
-                  <a:srgbClr val="000000"/>
-                </a:solidFill>
-              </a:rPr>
-              <a:t>data</a:t>
-            </a:r>
-            <a:r>
-              <a:rPr lang="de-CH" sz="2000" dirty="0">
-                <a:solidFill>
-                  <a:srgbClr val="000000"/>
-                </a:solidFill>
-              </a:rPr>
-              <a:t> </a:t>
-            </a:r>
-            <a:r>
-              <a:rPr lang="de-CH" sz="2000" dirty="0" err="1">
-                <a:solidFill>
-                  <a:srgbClr val="000000"/>
-                </a:solidFill>
-              </a:rPr>
-              <a:t>by</a:t>
-            </a:r>
-            <a:r>
-              <a:rPr lang="de-CH" sz="2000" dirty="0">
-                <a:solidFill>
-                  <a:srgbClr val="000000"/>
-                </a:solidFill>
-              </a:rPr>
-              <a:t> </a:t>
-            </a:r>
-            <a:r>
-              <a:rPr lang="de-CH" sz="2000" dirty="0" err="1">
-                <a:solidFill>
-                  <a:srgbClr val="000000"/>
-                </a:solidFill>
-              </a:rPr>
-              <a:t>simulation</a:t>
-            </a:r>
-            <a:endParaRPr lang="de-CH" sz="2000" dirty="0">
-              <a:solidFill>
-                <a:srgbClr val="000000"/>
-              </a:solidFill>
-            </a:endParaRPr>
-          </a:p>
-          <a:p>
-            <a:pPr marL="742950" lvl="1" indent="-285750" algn="l">
-              <a:buFont typeface="Arial" panose="020B0604020202020204" pitchFamily="34" charset="0"/>
-              <a:buChar char="•"/>
-            </a:pPr>
+              <a:t>Paper </a:t>
+            </a:r>
             <a:r>
               <a:rPr lang="de-CH" sz="1600" dirty="0" err="1">
                 <a:solidFill>
                   <a:srgbClr val="000000"/>
                 </a:solidFill>
               </a:rPr>
-              <a:t>based</a:t>
+              <a:t>of</a:t>
             </a:r>
             <a:r>
               <a:rPr lang="de-CH" sz="1600" dirty="0">
@@ -4191,40 +4039,19 @@
                   <a:srgbClr val="000000"/>
                 </a:solidFill>
               </a:rPr>
-              <a:t> on </a:t>
-            </a:r>
-            <a:r>
-              <a:rPr lang="de-CH" sz="1600" dirty="0" err="1">
-                <a:solidFill>
-                  <a:srgbClr val="000000"/>
-                </a:solidFill>
-              </a:rPr>
-              <a:t>thesis</a:t>
-            </a:r>
-            <a:r>
-              <a:rPr lang="de-CH" sz="1600" dirty="0">
-                <a:solidFill>
-                  <a:srgbClr val="000000"/>
-                </a:solidFill>
-              </a:rPr>
-              <a:t> </a:t>
-            </a:r>
-            <a:r>
-              <a:rPr lang="de-CH" sz="1600" dirty="0" err="1">
-                <a:solidFill>
-                  <a:srgbClr val="000000"/>
-                </a:solidFill>
-              </a:rPr>
-              <a:t>by</a:t>
-            </a:r>
-            <a:r>
-              <a:rPr lang="de-CH" sz="1600" dirty="0">
-                <a:solidFill>
-                  <a:srgbClr val="000000"/>
-                </a:solidFill>
-              </a:rPr>
-              <a:t> R. Wehner 1998</a:t>
-            </a:r>
+              <a:t> R. Wehner</a:t>
+            </a:r>
+          </a:p>
+          <a:p>
+            <a:pPr marL="285750" indent="-285750" algn="l">
+              <a:buFont typeface="Arial" panose="020B0604020202020204" pitchFamily="34" charset="0"/>
+              <a:buChar char="•"/>
+            </a:pPr>
+            <a:endParaRPr lang="de-CH" sz="1600" dirty="0">
+              <a:solidFill>
+                <a:srgbClr val="000000"/>
+              </a:solidFill>
+            </a:endParaRPr>
           </a:p>
         </p:txBody>
       </p:sp>
@@ -4265,6 +4092,125 @@
     <p:extLst>
       <p:ext uri="{BB962C8B-B14F-4D97-AF65-F5344CB8AC3E}">
         <p14:creationId xmlns:p14="http://schemas.microsoft.com/office/powerpoint/2010/main" val="2513955939"/>
+      </p:ext>
+    </p:extLst>
+  </p:cSld>
+  <p:clrMapOvr>
+    <a:masterClrMapping/>
+  </p:clrMapOvr>
+</p:sld>
+</file>
+
+<file path=ppt/slides/slide2.xml><?xml version="1.0" encoding="utf-8"?>
+<p:sld xmlns:a="http://schemas.openxmlformats.org/drawingml/2006/main" xmlns:r="http://schemas.openxmlformats.org/officeDocument/2006/relationships" xmlns:p="http://schemas.openxmlformats.org/presentationml/2006/main">
+  <p:cSld>
+    <p:spTree>
+      <p:nvGrpSpPr>
+        <p:cNvPr id="1" name=""/>
+        <p:cNvGrpSpPr/>
+        <p:nvPr/>
+      </p:nvGrpSpPr>
+      <p:grpSpPr>
+        <a:xfrm>
+          <a:off x="0" y="0"/>
+          <a:ext cx="0" cy="0"/>
+          <a:chOff x="0" y="0"/>
+          <a:chExt cx="0" cy="0"/>
+        </a:xfrm>
+      </p:grpSpPr>
+      <p:sp>
+        <p:nvSpPr>
+          <p:cNvPr id="2" name="Titel 1">
+            <a:extLst>
+              <a:ext uri="{FF2B5EF4-FFF2-40B4-BE49-F238E27FC236}">
+                <a16:creationId xmlns:a16="http://schemas.microsoft.com/office/drawing/2014/main" id="{6911A3BF-FF4F-4F3C-A97C-AF7BB6BEB792}"/>
+              </a:ext>
+            </a:extLst>
+          </p:cNvPr>
+          <p:cNvSpPr>
+            <a:spLocks noGrp="1"/>
+          </p:cNvSpPr>
+          <p:nvPr>
+            <p:ph type="title"/>
+          </p:nvPr>
+        </p:nvSpPr>
+        <p:spPr/>
+        <p:txBody>
+          <a:bodyPr/>
+          <a:lstStyle/>
+          <a:p>
+            <a:r>
+              <a:rPr lang="de-CH" dirty="0"/>
+              <a:t>Paper </a:t>
+            </a:r>
+            <a:r>
+              <a:rPr lang="de-CH" dirty="0" err="1"/>
+              <a:t>of</a:t>
+            </a:r>
+            <a:r>
+              <a:rPr lang="de-CH" dirty="0"/>
+              <a:t> R. Wehner</a:t>
+            </a:r>
+          </a:p>
+        </p:txBody>
+      </p:sp>
+      <p:sp>
+        <p:nvSpPr>
+          <p:cNvPr id="3" name="Inhaltsplatzhalter 2">
+            <a:extLst>
+              <a:ext uri="{FF2B5EF4-FFF2-40B4-BE49-F238E27FC236}">
+                <a16:creationId xmlns:a16="http://schemas.microsoft.com/office/drawing/2014/main" id="{3F9C8343-57AA-4D3E-AC88-05C8B37280B8}"/>
+              </a:ext>
+            </a:extLst>
+          </p:cNvPr>
+          <p:cNvSpPr>
+            <a:spLocks noGrp="1"/>
+          </p:cNvSpPr>
+          <p:nvPr>
+            <p:ph idx="1"/>
+          </p:nvPr>
+        </p:nvSpPr>
+        <p:spPr/>
+        <p:txBody>
+          <a:bodyPr/>
+          <a:lstStyle/>
+          <a:p>
+            <a:endParaRPr lang="de-CH" dirty="0"/>
+          </a:p>
+        </p:txBody>
+      </p:sp>
+      <p:sp>
+        <p:nvSpPr>
+          <p:cNvPr id="4" name="Fußzeilenplatzhalter 3">
+            <a:extLst>
+              <a:ext uri="{FF2B5EF4-FFF2-40B4-BE49-F238E27FC236}">
+                <a16:creationId xmlns:a16="http://schemas.microsoft.com/office/drawing/2014/main" id="{948DC6C5-E66E-4CFD-9A84-F79BA83ABA99}"/>
+              </a:ext>
+            </a:extLst>
+          </p:cNvPr>
+          <p:cNvSpPr>
+            <a:spLocks noGrp="1"/>
+          </p:cNvSpPr>
+          <p:nvPr>
+            <p:ph type="ftr" sz="quarter" idx="11"/>
+          </p:nvPr>
+        </p:nvSpPr>
+        <p:spPr/>
+        <p:txBody>
+          <a:bodyPr/>
+          <a:lstStyle/>
+          <a:p>
+            <a:r>
+              <a:rPr lang="de-CH"/>
+              <a:t>Josua Graf, Noah Zarro</a:t>
+            </a:r>
+          </a:p>
+        </p:txBody>
+      </p:sp>
+    </p:spTree>
+    <p:extLst>
+      <p:ext uri="{BB962C8B-B14F-4D97-AF65-F5344CB8AC3E}">
+        <p14:creationId xmlns:p14="http://schemas.microsoft.com/office/powerpoint/2010/main" val="876636335"/>
       </p:ext>
     </p:extLst>
   </p:cSld>

</xml_diff>